<commit_message>
initial design - in meeting
</commit_message>
<xml_diff>
--- a/bell_proj_initial_design.pptx
+++ b/bell_proj_initial_design.pptx
@@ -109,6 +109,11 @@
       </a:defRPr>
     </a:lvl9pPr>
   </p:defaultTextStyle>
+  <p:extLst>
+    <p:ext uri="{EFAFB233-063F-42B5-8137-9DF3F51BA10A}">
+      <p15:sldGuideLst xmlns:p15="http://schemas.microsoft.com/office/powerpoint/2012/main"/>
+    </p:ext>
+  </p:extLst>
 </p:presentation>
 </file>
 
@@ -315,7 +320,7 @@
           <a:p>
             <a:fld id="{CCE066BA-17A6-7841-8BAC-477FA90C3AC6}" type="datetimeFigureOut">
               <a:rPr lang="en-US" smtClean="0"/>
-              <a:t>5/15/23</a:t>
+              <a:t>5/17/23</a:t>
             </a:fld>
             <a:endParaRPr lang="en-US"/>
           </a:p>
@@ -513,7 +518,7 @@
           <a:p>
             <a:fld id="{CCE066BA-17A6-7841-8BAC-477FA90C3AC6}" type="datetimeFigureOut">
               <a:rPr lang="en-US" smtClean="0"/>
-              <a:t>5/15/23</a:t>
+              <a:t>5/17/23</a:t>
             </a:fld>
             <a:endParaRPr lang="en-US"/>
           </a:p>
@@ -721,7 +726,7 @@
           <a:p>
             <a:fld id="{CCE066BA-17A6-7841-8BAC-477FA90C3AC6}" type="datetimeFigureOut">
               <a:rPr lang="en-US" smtClean="0"/>
-              <a:t>5/15/23</a:t>
+              <a:t>5/17/23</a:t>
             </a:fld>
             <a:endParaRPr lang="en-US"/>
           </a:p>
@@ -919,7 +924,7 @@
           <a:p>
             <a:fld id="{CCE066BA-17A6-7841-8BAC-477FA90C3AC6}" type="datetimeFigureOut">
               <a:rPr lang="en-US" smtClean="0"/>
-              <a:t>5/15/23</a:t>
+              <a:t>5/17/23</a:t>
             </a:fld>
             <a:endParaRPr lang="en-US"/>
           </a:p>
@@ -1194,7 +1199,7 @@
           <a:p>
             <a:fld id="{CCE066BA-17A6-7841-8BAC-477FA90C3AC6}" type="datetimeFigureOut">
               <a:rPr lang="en-US" smtClean="0"/>
-              <a:t>5/15/23</a:t>
+              <a:t>5/17/23</a:t>
             </a:fld>
             <a:endParaRPr lang="en-US"/>
           </a:p>
@@ -1459,7 +1464,7 @@
           <a:p>
             <a:fld id="{CCE066BA-17A6-7841-8BAC-477FA90C3AC6}" type="datetimeFigureOut">
               <a:rPr lang="en-US" smtClean="0"/>
-              <a:t>5/15/23</a:t>
+              <a:t>5/17/23</a:t>
             </a:fld>
             <a:endParaRPr lang="en-US"/>
           </a:p>
@@ -1871,7 +1876,7 @@
           <a:p>
             <a:fld id="{CCE066BA-17A6-7841-8BAC-477FA90C3AC6}" type="datetimeFigureOut">
               <a:rPr lang="en-US" smtClean="0"/>
-              <a:t>5/15/23</a:t>
+              <a:t>5/17/23</a:t>
             </a:fld>
             <a:endParaRPr lang="en-US"/>
           </a:p>
@@ -2012,7 +2017,7 @@
           <a:p>
             <a:fld id="{CCE066BA-17A6-7841-8BAC-477FA90C3AC6}" type="datetimeFigureOut">
               <a:rPr lang="en-US" smtClean="0"/>
-              <a:t>5/15/23</a:t>
+              <a:t>5/17/23</a:t>
             </a:fld>
             <a:endParaRPr lang="en-US"/>
           </a:p>
@@ -2125,7 +2130,7 @@
           <a:p>
             <a:fld id="{CCE066BA-17A6-7841-8BAC-477FA90C3AC6}" type="datetimeFigureOut">
               <a:rPr lang="en-US" smtClean="0"/>
-              <a:t>5/15/23</a:t>
+              <a:t>5/17/23</a:t>
             </a:fld>
             <a:endParaRPr lang="en-US"/>
           </a:p>
@@ -2436,7 +2441,7 @@
           <a:p>
             <a:fld id="{CCE066BA-17A6-7841-8BAC-477FA90C3AC6}" type="datetimeFigureOut">
               <a:rPr lang="en-US" smtClean="0"/>
-              <a:t>5/15/23</a:t>
+              <a:t>5/17/23</a:t>
             </a:fld>
             <a:endParaRPr lang="en-US"/>
           </a:p>
@@ -2724,7 +2729,7 @@
           <a:p>
             <a:fld id="{CCE066BA-17A6-7841-8BAC-477FA90C3AC6}" type="datetimeFigureOut">
               <a:rPr lang="en-US" smtClean="0"/>
-              <a:t>5/15/23</a:t>
+              <a:t>5/17/23</a:t>
             </a:fld>
             <a:endParaRPr lang="en-US"/>
           </a:p>
@@ -2965,7 +2970,7 @@
           <a:p>
             <a:fld id="{CCE066BA-17A6-7841-8BAC-477FA90C3AC6}" type="datetimeFigureOut">
               <a:rPr lang="en-US" smtClean="0"/>
-              <a:t>5/15/23</a:t>
+              <a:t>5/17/23</a:t>
             </a:fld>
             <a:endParaRPr lang="en-US"/>
           </a:p>
@@ -3670,8 +3675,8 @@
           </a:fontRef>
         </p:style>
       </p:cxnSp>
-      <mc:AlternateContent xmlns:mc="http://schemas.openxmlformats.org/markup-compatibility/2006">
-        <mc:Choice xmlns:p14="http://schemas.microsoft.com/office/powerpoint/2010/main" Requires="p14">
+      <mc:AlternateContent xmlns:mc="http://schemas.openxmlformats.org/markup-compatibility/2006" xmlns:p14="http://schemas.microsoft.com/office/powerpoint/2010/main">
+        <mc:Choice Requires="p14">
           <p:contentPart p14:bwMode="auto" r:id="rId2">
             <p14:nvContentPartPr>
               <p14:cNvPr id="12" name="Ink 11">
@@ -3690,7 +3695,7 @@
             </p14:xfrm>
           </p:contentPart>
         </mc:Choice>
-        <mc:Fallback>
+        <mc:Fallback xmlns="">
           <p:pic>
             <p:nvPicPr>
               <p:cNvPr id="12" name="Ink 11">
@@ -3757,8 +3762,8 @@
           </a:fontRef>
         </p:style>
       </p:cxnSp>
-      <mc:AlternateContent xmlns:mc="http://schemas.openxmlformats.org/markup-compatibility/2006">
-        <mc:Choice xmlns:p14="http://schemas.microsoft.com/office/powerpoint/2010/main" Requires="p14">
+      <mc:AlternateContent xmlns:mc="http://schemas.openxmlformats.org/markup-compatibility/2006" xmlns:p14="http://schemas.microsoft.com/office/powerpoint/2010/main">
+        <mc:Choice Requires="p14">
           <p:contentPart p14:bwMode="auto" r:id="rId4">
             <p14:nvContentPartPr>
               <p14:cNvPr id="15" name="Ink 14">
@@ -3777,7 +3782,7 @@
             </p14:xfrm>
           </p:contentPart>
         </mc:Choice>
-        <mc:Fallback>
+        <mc:Fallback xmlns="">
           <p:pic>
             <p:nvPicPr>
               <p:cNvPr id="15" name="Ink 14">
@@ -4240,6 +4245,87 @@
           <a:p>
             <a:pPr algn="ctr"/>
             <a:endParaRPr lang="en-US"/>
+          </a:p>
+        </p:txBody>
+      </p:sp>
+      <p:sp>
+        <p:nvSpPr>
+          <p:cNvPr id="3" name="Rectangle 2">
+            <a:extLst>
+              <a:ext uri="{FF2B5EF4-FFF2-40B4-BE49-F238E27FC236}">
+                <a16:creationId xmlns:a16="http://schemas.microsoft.com/office/drawing/2014/main" id="{769105DC-670F-6336-87F1-9E36CB44C643}"/>
+              </a:ext>
+            </a:extLst>
+          </p:cNvPr>
+          <p:cNvSpPr/>
+          <p:nvPr/>
+        </p:nvSpPr>
+        <p:spPr>
+          <a:xfrm>
+            <a:off x="5135459" y="2529960"/>
+            <a:ext cx="1921079" cy="2332140"/>
+          </a:xfrm>
+          <a:prstGeom prst="rect">
+            <a:avLst/>
+          </a:prstGeom>
+        </p:spPr>
+        <p:style>
+          <a:lnRef idx="2">
+            <a:schemeClr val="accent1">
+              <a:shade val="15000"/>
+            </a:schemeClr>
+          </a:lnRef>
+          <a:fillRef idx="1">
+            <a:schemeClr val="accent1"/>
+          </a:fillRef>
+          <a:effectRef idx="0">
+            <a:schemeClr val="accent1"/>
+          </a:effectRef>
+          <a:fontRef idx="minor">
+            <a:schemeClr val="lt1"/>
+          </a:fontRef>
+        </p:style>
+        <p:txBody>
+          <a:bodyPr rtlCol="0" anchor="ctr"/>
+          <a:lstStyle/>
+          <a:p>
+            <a:pPr algn="ctr"/>
+            <a:endParaRPr lang="en-US"/>
+          </a:p>
+        </p:txBody>
+      </p:sp>
+      <p:sp>
+        <p:nvSpPr>
+          <p:cNvPr id="5" name="TextBox 4">
+            <a:extLst>
+              <a:ext uri="{FF2B5EF4-FFF2-40B4-BE49-F238E27FC236}">
+                <a16:creationId xmlns:a16="http://schemas.microsoft.com/office/drawing/2014/main" id="{B5F2269C-12A6-EA7F-4D13-D47EE57A65DA}"/>
+              </a:ext>
+            </a:extLst>
+          </p:cNvPr>
+          <p:cNvSpPr txBox="1"/>
+          <p:nvPr/>
+        </p:nvSpPr>
+        <p:spPr>
+          <a:xfrm>
+            <a:off x="5545123" y="3221372"/>
+            <a:ext cx="1166070" cy="1200329"/>
+          </a:xfrm>
+          <a:prstGeom prst="rect">
+            <a:avLst/>
+          </a:prstGeom>
+          <a:noFill/>
+        </p:spPr>
+        <p:txBody>
+          <a:bodyPr wrap="square" rtlCol="0">
+            <a:spAutoFit/>
+          </a:bodyPr>
+          <a:lstStyle/>
+          <a:p>
+            <a:r>
+              <a:rPr lang="en-US" dirty="0"/>
+              <a:t>Someone will be with you shortly.</a:t>
+            </a:r>
           </a:p>
         </p:txBody>
       </p:sp>

</xml_diff>